<commit_message>
adding TiBountyHunter notes, changes
</commit_message>
<xml_diff>
--- a/315.pptx
+++ b/315.pptx
@@ -923,19 +923,7 @@
                 <a:cs typeface="Times New Roman" charset="0"/>
                 <a:sym typeface="Times New Roman" charset="0"/>
               </a:rPr>
-              <a:t>Walk </a:t>
-            </a:r>
-            <a:r>
-              <a:rPr lang="en-US" baseline="0" dirty="0" smtClean="0">
-                <a:solidFill>
-                  <a:srgbClr val="000000"/>
-                </a:solidFill>
-                <a:latin typeface="Times New Roman" charset="0"/>
-                <a:ea typeface="ＭＳ Ｐゴシック" charset="0"/>
-                <a:cs typeface="Times New Roman" charset="0"/>
-                <a:sym typeface="Times New Roman" charset="0"/>
-              </a:rPr>
-              <a:t>through the finished code</a:t>
+              <a:t>Walk through the finished code</a:t>
             </a:r>
           </a:p>
           <a:p>
@@ -978,7 +966,433 @@
                 <a:cs typeface="Times New Roman" charset="0"/>
                 <a:sym typeface="Times New Roman" charset="0"/>
               </a:rPr>
-              <a:t> custom component code</a:t>
+              <a:t> custom component </a:t>
+            </a:r>
+            <a:r>
+              <a:rPr lang="en-US" baseline="0" dirty="0" smtClean="0">
+                <a:solidFill>
+                  <a:srgbClr val="000000"/>
+                </a:solidFill>
+                <a:latin typeface="Times New Roman" charset="0"/>
+                <a:ea typeface="ＭＳ Ｐゴシック" charset="0"/>
+                <a:cs typeface="Times New Roman" charset="0"/>
+                <a:sym typeface="Times New Roman" charset="0"/>
+              </a:rPr>
+              <a:t>code</a:t>
+            </a:r>
+          </a:p>
+          <a:p>
+            <a:pPr marL="119063" eaLnBrk="1" hangingPunct="1">
+              <a:spcBef>
+                <a:spcPts val="450"/>
+              </a:spcBef>
+            </a:pPr>
+            <a:endParaRPr lang="en-US" baseline="0" dirty="0" smtClean="0">
+              <a:solidFill>
+                <a:srgbClr val="000000"/>
+              </a:solidFill>
+              <a:latin typeface="Times New Roman" charset="0"/>
+              <a:ea typeface="ＭＳ Ｐゴシック" charset="0"/>
+              <a:cs typeface="Times New Roman" charset="0"/>
+              <a:sym typeface="Times New Roman" charset="0"/>
+            </a:endParaRPr>
+          </a:p>
+          <a:p>
+            <a:pPr marL="119063" eaLnBrk="1" hangingPunct="1">
+              <a:spcBef>
+                <a:spcPts val="450"/>
+              </a:spcBef>
+            </a:pPr>
+            <a:r>
+              <a:rPr lang="en-US" baseline="0" dirty="0" smtClean="0">
+                <a:solidFill>
+                  <a:srgbClr val="000000"/>
+                </a:solidFill>
+                <a:latin typeface="Times New Roman" charset="0"/>
+                <a:ea typeface="ＭＳ Ｐゴシック" charset="0"/>
+                <a:cs typeface="Times New Roman" charset="0"/>
+                <a:sym typeface="Times New Roman" charset="0"/>
+              </a:rPr>
+              <a:t>Code walkthrough high points – </a:t>
+            </a:r>
+            <a:r>
+              <a:rPr lang="en-US" baseline="0" dirty="0" err="1" smtClean="0">
+                <a:solidFill>
+                  <a:srgbClr val="000000"/>
+                </a:solidFill>
+                <a:latin typeface="Times New Roman" charset="0"/>
+                <a:ea typeface="ＭＳ Ｐゴシック" charset="0"/>
+                <a:cs typeface="Times New Roman" charset="0"/>
+                <a:sym typeface="Times New Roman" charset="0"/>
+              </a:rPr>
+              <a:t>ui.js</a:t>
+            </a:r>
+            <a:r>
+              <a:rPr lang="en-US" baseline="0" dirty="0" smtClean="0">
+                <a:solidFill>
+                  <a:srgbClr val="000000"/>
+                </a:solidFill>
+                <a:latin typeface="Times New Roman" charset="0"/>
+                <a:ea typeface="ＭＳ Ｐゴシック" charset="0"/>
+                <a:cs typeface="Times New Roman" charset="0"/>
+                <a:sym typeface="Times New Roman" charset="0"/>
+              </a:rPr>
+              <a:t>, the </a:t>
+            </a:r>
+            <a:r>
+              <a:rPr lang="en-US" baseline="0" dirty="0" err="1" smtClean="0">
+                <a:solidFill>
+                  <a:srgbClr val="000000"/>
+                </a:solidFill>
+                <a:latin typeface="Times New Roman" charset="0"/>
+                <a:ea typeface="ＭＳ Ｐゴシック" charset="0"/>
+                <a:cs typeface="Times New Roman" charset="0"/>
+                <a:sym typeface="Times New Roman" charset="0"/>
+              </a:rPr>
+              <a:t>tabView</a:t>
+            </a:r>
+            <a:r>
+              <a:rPr lang="en-US" baseline="0" dirty="0" smtClean="0">
+                <a:solidFill>
+                  <a:srgbClr val="000000"/>
+                </a:solidFill>
+                <a:latin typeface="Times New Roman" charset="0"/>
+                <a:ea typeface="ＭＳ Ｐゴシック" charset="0"/>
+                <a:cs typeface="Times New Roman" charset="0"/>
+                <a:sym typeface="Times New Roman" charset="0"/>
+              </a:rPr>
+              <a:t> component (function </a:t>
+            </a:r>
+            <a:r>
+              <a:rPr lang="en-US" baseline="0" dirty="0" err="1" smtClean="0">
+                <a:solidFill>
+                  <a:srgbClr val="000000"/>
+                </a:solidFill>
+                <a:latin typeface="Times New Roman" charset="0"/>
+                <a:ea typeface="ＭＳ Ｐゴシック" charset="0"/>
+                <a:cs typeface="Times New Roman" charset="0"/>
+                <a:sym typeface="Times New Roman" charset="0"/>
+              </a:rPr>
+              <a:t>tabView</a:t>
+            </a:r>
+            <a:r>
+              <a:rPr lang="en-US" baseline="0" dirty="0" smtClean="0">
+                <a:solidFill>
+                  <a:srgbClr val="000000"/>
+                </a:solidFill>
+                <a:latin typeface="Times New Roman" charset="0"/>
+                <a:ea typeface="ＭＳ Ｐゴシック" charset="0"/>
+                <a:cs typeface="Times New Roman" charset="0"/>
+                <a:sym typeface="Times New Roman" charset="0"/>
+              </a:rPr>
+              <a:t>())</a:t>
+            </a:r>
+          </a:p>
+          <a:p>
+            <a:pPr marL="119063" eaLnBrk="1" hangingPunct="1">
+              <a:spcBef>
+                <a:spcPts val="450"/>
+              </a:spcBef>
+            </a:pPr>
+            <a:endParaRPr lang="en-US" baseline="0" dirty="0" smtClean="0">
+              <a:solidFill>
+                <a:srgbClr val="000000"/>
+              </a:solidFill>
+              <a:latin typeface="Times New Roman" charset="0"/>
+              <a:ea typeface="ＭＳ Ｐゴシック" charset="0"/>
+              <a:cs typeface="Times New Roman" charset="0"/>
+              <a:sym typeface="Times New Roman" charset="0"/>
+            </a:endParaRPr>
+          </a:p>
+          <a:p>
+            <a:pPr marL="119063" eaLnBrk="1" hangingPunct="1">
+              <a:spcBef>
+                <a:spcPts val="450"/>
+              </a:spcBef>
+            </a:pPr>
+            <a:r>
+              <a:rPr lang="en-US" baseline="0" dirty="0" smtClean="0">
+                <a:solidFill>
+                  <a:srgbClr val="000000"/>
+                </a:solidFill>
+                <a:latin typeface="Times New Roman" charset="0"/>
+                <a:ea typeface="ＭＳ Ｐゴシック" charset="0"/>
+                <a:cs typeface="Times New Roman" charset="0"/>
+                <a:sym typeface="Times New Roman" charset="0"/>
+              </a:rPr>
+              <a:t>The custom tab bar is the primary bit of custom/advanced UI in the app.  Walk through how this component works, how it uses custom events, and how we add functions to the object, like:</a:t>
+            </a:r>
+          </a:p>
+          <a:p>
+            <a:pPr marL="119063" eaLnBrk="1" hangingPunct="1">
+              <a:spcBef>
+                <a:spcPts val="450"/>
+              </a:spcBef>
+            </a:pPr>
+            <a:endParaRPr lang="en-US" baseline="0" dirty="0" smtClean="0">
+              <a:solidFill>
+                <a:srgbClr val="000000"/>
+              </a:solidFill>
+              <a:latin typeface="Times New Roman" charset="0"/>
+              <a:ea typeface="ＭＳ Ｐゴシック" charset="0"/>
+              <a:cs typeface="Times New Roman" charset="0"/>
+              <a:sym typeface="Times New Roman" charset="0"/>
+            </a:endParaRPr>
+          </a:p>
+          <a:p>
+            <a:pPr marL="119063" marR="0" indent="0" algn="l" defTabSz="914400" rtl="0" eaLnBrk="1" fontAlgn="base" latinLnBrk="0" hangingPunct="1">
+              <a:lnSpc>
+                <a:spcPct val="100000"/>
+              </a:lnSpc>
+              <a:spcBef>
+                <a:spcPts val="450"/>
+              </a:spcBef>
+              <a:spcAft>
+                <a:spcPct val="0"/>
+              </a:spcAft>
+              <a:buClrTx/>
+              <a:buSzTx/>
+              <a:buFontTx/>
+              <a:buNone/>
+              <a:tabLst/>
+              <a:defRPr/>
+            </a:pPr>
+            <a:r>
+              <a:rPr lang="en-US" dirty="0" err="1" smtClean="0">
+                <a:solidFill>
+                  <a:srgbClr val="000000"/>
+                </a:solidFill>
+                <a:latin typeface="Times New Roman" charset="0"/>
+                <a:ea typeface="ＭＳ Ｐゴシック" charset="0"/>
+                <a:cs typeface="Times New Roman" charset="0"/>
+                <a:sym typeface="Times New Roman" charset="0"/>
+              </a:rPr>
+              <a:t>container.toggle</a:t>
+            </a:r>
+            <a:r>
+              <a:rPr lang="en-US" dirty="0" smtClean="0">
+                <a:solidFill>
+                  <a:srgbClr val="000000"/>
+                </a:solidFill>
+                <a:latin typeface="Times New Roman" charset="0"/>
+                <a:ea typeface="ＭＳ Ｐゴシック" charset="0"/>
+                <a:cs typeface="Times New Roman" charset="0"/>
+                <a:sym typeface="Times New Roman" charset="0"/>
+              </a:rPr>
+              <a:t> = function(on) {</a:t>
+            </a:r>
+          </a:p>
+          <a:p>
+            <a:pPr marL="119063" marR="0" indent="0" algn="l" defTabSz="914400" rtl="0" eaLnBrk="1" fontAlgn="base" latinLnBrk="0" hangingPunct="1">
+              <a:lnSpc>
+                <a:spcPct val="100000"/>
+              </a:lnSpc>
+              <a:spcBef>
+                <a:spcPts val="450"/>
+              </a:spcBef>
+              <a:spcAft>
+                <a:spcPct val="0"/>
+              </a:spcAft>
+              <a:buClrTx/>
+              <a:buSzTx/>
+              <a:buFontTx/>
+              <a:buNone/>
+              <a:tabLst/>
+              <a:defRPr/>
+            </a:pPr>
+            <a:r>
+              <a:rPr lang="en-US" dirty="0" smtClean="0">
+                <a:solidFill>
+                  <a:srgbClr val="000000"/>
+                </a:solidFill>
+                <a:latin typeface="Times New Roman" charset="0"/>
+                <a:ea typeface="ＭＳ Ｐゴシック" charset="0"/>
+                <a:cs typeface="Times New Roman" charset="0"/>
+                <a:sym typeface="Times New Roman" charset="0"/>
+              </a:rPr>
+              <a:t>	</a:t>
+            </a:r>
+            <a:r>
+              <a:rPr lang="en-US" dirty="0" err="1" smtClean="0">
+                <a:solidFill>
+                  <a:srgbClr val="000000"/>
+                </a:solidFill>
+                <a:latin typeface="Times New Roman" charset="0"/>
+                <a:ea typeface="ＭＳ Ｐゴシック" charset="0"/>
+                <a:cs typeface="Times New Roman" charset="0"/>
+                <a:sym typeface="Times New Roman" charset="0"/>
+              </a:rPr>
+              <a:t>icon.image</a:t>
+            </a:r>
+            <a:r>
+              <a:rPr lang="en-US" dirty="0" smtClean="0">
+                <a:solidFill>
+                  <a:srgbClr val="000000"/>
+                </a:solidFill>
+                <a:latin typeface="Times New Roman" charset="0"/>
+                <a:ea typeface="ＭＳ Ｐゴシック" charset="0"/>
+                <a:cs typeface="Times New Roman" charset="0"/>
+                <a:sym typeface="Times New Roman" charset="0"/>
+              </a:rPr>
+              <a:t> = (on) ? </a:t>
+            </a:r>
+            <a:r>
+              <a:rPr lang="en-US" dirty="0" err="1" smtClean="0">
+                <a:solidFill>
+                  <a:srgbClr val="000000"/>
+                </a:solidFill>
+                <a:latin typeface="Times New Roman" charset="0"/>
+                <a:ea typeface="ＭＳ Ｐゴシック" charset="0"/>
+                <a:cs typeface="Times New Roman" charset="0"/>
+                <a:sym typeface="Times New Roman" charset="0"/>
+              </a:rPr>
+              <a:t>options.on</a:t>
+            </a:r>
+            <a:r>
+              <a:rPr lang="en-US" dirty="0" smtClean="0">
+                <a:solidFill>
+                  <a:srgbClr val="000000"/>
+                </a:solidFill>
+                <a:latin typeface="Times New Roman" charset="0"/>
+                <a:ea typeface="ＭＳ Ｐゴシック" charset="0"/>
+                <a:cs typeface="Times New Roman" charset="0"/>
+                <a:sym typeface="Times New Roman" charset="0"/>
+              </a:rPr>
+              <a:t> : </a:t>
+            </a:r>
+            <a:r>
+              <a:rPr lang="en-US" dirty="0" err="1" smtClean="0">
+                <a:solidFill>
+                  <a:srgbClr val="000000"/>
+                </a:solidFill>
+                <a:latin typeface="Times New Roman" charset="0"/>
+                <a:ea typeface="ＭＳ Ｐゴシック" charset="0"/>
+                <a:cs typeface="Times New Roman" charset="0"/>
+                <a:sym typeface="Times New Roman" charset="0"/>
+              </a:rPr>
+              <a:t>options.off</a:t>
+            </a:r>
+            <a:r>
+              <a:rPr lang="en-US" dirty="0" smtClean="0">
+                <a:solidFill>
+                  <a:srgbClr val="000000"/>
+                </a:solidFill>
+                <a:latin typeface="Times New Roman" charset="0"/>
+                <a:ea typeface="ＭＳ Ｐゴシック" charset="0"/>
+                <a:cs typeface="Times New Roman" charset="0"/>
+                <a:sym typeface="Times New Roman" charset="0"/>
+              </a:rPr>
+              <a:t>;</a:t>
+            </a:r>
+          </a:p>
+          <a:p>
+            <a:pPr marL="119063" marR="0" indent="0" algn="l" defTabSz="914400" rtl="0" eaLnBrk="1" fontAlgn="base" latinLnBrk="0" hangingPunct="1">
+              <a:lnSpc>
+                <a:spcPct val="100000"/>
+              </a:lnSpc>
+              <a:spcBef>
+                <a:spcPts val="450"/>
+              </a:spcBef>
+              <a:spcAft>
+                <a:spcPct val="0"/>
+              </a:spcAft>
+              <a:buClrTx/>
+              <a:buSzTx/>
+              <a:buFontTx/>
+              <a:buNone/>
+              <a:tabLst/>
+              <a:defRPr/>
+            </a:pPr>
+            <a:r>
+              <a:rPr lang="en-US" dirty="0" smtClean="0">
+                <a:solidFill>
+                  <a:srgbClr val="000000"/>
+                </a:solidFill>
+                <a:latin typeface="Times New Roman" charset="0"/>
+                <a:ea typeface="ＭＳ Ｐゴシック" charset="0"/>
+                <a:cs typeface="Times New Roman" charset="0"/>
+                <a:sym typeface="Times New Roman" charset="0"/>
+              </a:rPr>
+              <a:t>	</a:t>
+            </a:r>
+            <a:r>
+              <a:rPr lang="en-US" dirty="0" err="1" smtClean="0">
+                <a:solidFill>
+                  <a:srgbClr val="000000"/>
+                </a:solidFill>
+                <a:latin typeface="Times New Roman" charset="0"/>
+                <a:ea typeface="ＭＳ Ｐゴシック" charset="0"/>
+                <a:cs typeface="Times New Roman" charset="0"/>
+                <a:sym typeface="Times New Roman" charset="0"/>
+              </a:rPr>
+              <a:t>container.backgroundImage</a:t>
+            </a:r>
+            <a:r>
+              <a:rPr lang="en-US" dirty="0" smtClean="0">
+                <a:solidFill>
+                  <a:srgbClr val="000000"/>
+                </a:solidFill>
+                <a:latin typeface="Times New Roman" charset="0"/>
+                <a:ea typeface="ＭＳ Ｐゴシック" charset="0"/>
+                <a:cs typeface="Times New Roman" charset="0"/>
+                <a:sym typeface="Times New Roman" charset="0"/>
+              </a:rPr>
+              <a:t> = (on) ? 'images/</a:t>
+            </a:r>
+            <a:r>
+              <a:rPr lang="en-US" dirty="0" err="1" smtClean="0">
+                <a:solidFill>
+                  <a:srgbClr val="000000"/>
+                </a:solidFill>
+                <a:latin typeface="Times New Roman" charset="0"/>
+                <a:ea typeface="ＭＳ Ｐゴシック" charset="0"/>
+                <a:cs typeface="Times New Roman" charset="0"/>
+                <a:sym typeface="Times New Roman" charset="0"/>
+              </a:rPr>
+              <a:t>tab.png</a:t>
+            </a:r>
+            <a:r>
+              <a:rPr lang="en-US" dirty="0" smtClean="0">
+                <a:solidFill>
+                  <a:srgbClr val="000000"/>
+                </a:solidFill>
+                <a:latin typeface="Times New Roman" charset="0"/>
+                <a:ea typeface="ＭＳ Ｐゴシック" charset="0"/>
+                <a:cs typeface="Times New Roman" charset="0"/>
+                <a:sym typeface="Times New Roman" charset="0"/>
+              </a:rPr>
+              <a:t>' : '';</a:t>
+            </a:r>
+          </a:p>
+          <a:p>
+            <a:pPr marL="119063" marR="0" indent="0" algn="l" defTabSz="914400" rtl="0" eaLnBrk="1" fontAlgn="base" latinLnBrk="0" hangingPunct="1">
+              <a:lnSpc>
+                <a:spcPct val="100000"/>
+              </a:lnSpc>
+              <a:spcBef>
+                <a:spcPts val="450"/>
+              </a:spcBef>
+              <a:spcAft>
+                <a:spcPct val="0"/>
+              </a:spcAft>
+              <a:buClrTx/>
+              <a:buSzTx/>
+              <a:buFontTx/>
+              <a:buNone/>
+              <a:tabLst/>
+              <a:defRPr/>
+            </a:pPr>
+            <a:r>
+              <a:rPr lang="en-US" dirty="0" smtClean="0">
+                <a:solidFill>
+                  <a:srgbClr val="000000"/>
+                </a:solidFill>
+                <a:latin typeface="Times New Roman" charset="0"/>
+                <a:ea typeface="ＭＳ Ｐゴシック" charset="0"/>
+                <a:cs typeface="Times New Roman" charset="0"/>
+                <a:sym typeface="Times New Roman" charset="0"/>
+              </a:rPr>
+              <a:t>};</a:t>
             </a:r>
             <a:endParaRPr lang="en-US" dirty="0">
               <a:solidFill>
@@ -3519,7 +3933,7 @@
               <a:pPr>
                 <a:defRPr/>
               </a:pPr>
-              <a:t>7/21/11</a:t>
+              <a:t>7/26/11</a:t>
             </a:fld>
             <a:endParaRPr lang="en-US"/>
           </a:p>
@@ -3935,7 +4349,7 @@
               <a:pPr>
                 <a:defRPr/>
               </a:pPr>
-              <a:t>7/21/11</a:t>
+              <a:t>7/26/11</a:t>
             </a:fld>
             <a:endParaRPr lang="en-US"/>
           </a:p>
@@ -4655,7 +5069,7 @@
               <a:pPr>
                 <a:defRPr/>
               </a:pPr>
-              <a:t>7/21/11</a:t>
+              <a:t>7/26/11</a:t>
             </a:fld>
             <a:endParaRPr lang="en-US"/>
           </a:p>
@@ -5208,7 +5622,7 @@
               <a:pPr>
                 <a:defRPr/>
               </a:pPr>
-              <a:t>7/21/11</a:t>
+              <a:t>7/26/11</a:t>
             </a:fld>
             <a:endParaRPr lang="en-US"/>
           </a:p>
@@ -5559,7 +5973,7 @@
               <a:pPr>
                 <a:defRPr/>
               </a:pPr>
-              <a:t>7/21/11</a:t>
+              <a:t>7/26/11</a:t>
             </a:fld>
             <a:endParaRPr lang="en-US"/>
           </a:p>
@@ -5917,7 +6331,7 @@
               <a:pPr>
                 <a:defRPr/>
               </a:pPr>
-              <a:t>7/21/11</a:t>
+              <a:t>7/26/11</a:t>
             </a:fld>
             <a:endParaRPr lang="en-US"/>
           </a:p>
@@ -6152,7 +6566,7 @@
               <a:pPr>
                 <a:defRPr/>
               </a:pPr>
-              <a:t>7/21/11</a:t>
+              <a:t>7/26/11</a:t>
             </a:fld>
             <a:endParaRPr lang="en-US"/>
           </a:p>
@@ -6444,7 +6858,7 @@
               <a:pPr>
                 <a:defRPr/>
               </a:pPr>
-              <a:t>7/21/11</a:t>
+              <a:t>7/26/11</a:t>
             </a:fld>
             <a:endParaRPr lang="en-US"/>
           </a:p>
@@ -7727,11 +8141,7 @@
             </a:pPr>
             <a:r>
               <a:rPr lang="en-US" dirty="0" smtClean="0"/>
-              <a:t>Demo and w</a:t>
-            </a:r>
-            <a:r>
-              <a:rPr lang="en-US" dirty="0" smtClean="0"/>
-              <a:t>iki URL</a:t>
+              <a:t>Demo and wiki URL</a:t>
             </a:r>
             <a:endParaRPr lang="en-US" dirty="0"/>
           </a:p>

</xml_diff>